<commit_message>
Remove footer from slides
</commit_message>
<xml_diff>
--- a/presentation.pptx
+++ b/presentation.pptx
@@ -939,7 +939,7 @@
           <a:bodyPr/>
           <a:lstStyle/>
           <a:p>
-            <a:fld id="{9637EF54-1728-DC42-B539-83B3F1DA260F}" type="datetime1">
+            <a:fld id="{8937BC03-0C09-3541-A6CA-B9A07D0F1D37}" type="datetime1">
               <a:rPr lang="en-US" smtClean="0"/>
               <a:t>6/6/16</a:t>
             </a:fld>
@@ -962,10 +962,6 @@
           <a:bodyPr/>
           <a:lstStyle/>
           <a:p>
-            <a:r>
-              <a:rPr lang="en-US" smtClean="0"/>
-              <a:t>https://github.com/StoneyJackson/git-ccscne-2016</a:t>
-            </a:r>
             <a:endParaRPr lang="en-US"/>
           </a:p>
         </p:txBody>
@@ -1113,7 +1109,7 @@
           <a:bodyPr/>
           <a:lstStyle/>
           <a:p>
-            <a:fld id="{3A4DAA0A-A425-D143-8736-3C4986C1A6C0}" type="datetime1">
+            <a:fld id="{606299C8-5F78-EF47-B29B-B4A5833F4288}" type="datetime1">
               <a:rPr lang="en-US" smtClean="0"/>
               <a:t>6/6/16</a:t>
             </a:fld>
@@ -1136,10 +1132,6 @@
           <a:bodyPr/>
           <a:lstStyle/>
           <a:p>
-            <a:r>
-              <a:rPr lang="en-US" smtClean="0"/>
-              <a:t>https://github.com/StoneyJackson/git-ccscne-2016</a:t>
-            </a:r>
             <a:endParaRPr lang="en-US"/>
           </a:p>
         </p:txBody>
@@ -1297,7 +1289,7 @@
           <a:bodyPr/>
           <a:lstStyle/>
           <a:p>
-            <a:fld id="{113C958C-844A-0843-8A5A-8A0491185A78}" type="datetime1">
+            <a:fld id="{F063F1F1-A86F-DF42-AFA3-7C9A041CDC47}" type="datetime1">
               <a:rPr lang="en-US" smtClean="0"/>
               <a:t>6/6/16</a:t>
             </a:fld>
@@ -1320,10 +1312,6 @@
           <a:bodyPr/>
           <a:lstStyle/>
           <a:p>
-            <a:r>
-              <a:rPr lang="en-US" smtClean="0"/>
-              <a:t>https://github.com/StoneyJackson/git-ccscne-2016</a:t>
-            </a:r>
             <a:endParaRPr lang="en-US"/>
           </a:p>
         </p:txBody>
@@ -1471,7 +1459,7 @@
           <a:bodyPr/>
           <a:lstStyle/>
           <a:p>
-            <a:fld id="{4F3BE216-2110-CF47-8E6B-50B6C2C5B54A}" type="datetime1">
+            <a:fld id="{D3A08924-5E09-4A4B-A06A-CCD0D5FF2E9A}" type="datetime1">
               <a:rPr lang="en-US" smtClean="0"/>
               <a:t>6/6/16</a:t>
             </a:fld>
@@ -1494,10 +1482,6 @@
           <a:bodyPr/>
           <a:lstStyle/>
           <a:p>
-            <a:r>
-              <a:rPr lang="en-US" smtClean="0"/>
-              <a:t>https://github.com/StoneyJackson/git-ccscne-2016</a:t>
-            </a:r>
             <a:endParaRPr lang="en-US"/>
           </a:p>
         </p:txBody>
@@ -1721,7 +1705,7 @@
           <a:bodyPr/>
           <a:lstStyle/>
           <a:p>
-            <a:fld id="{3FFE9EC6-FB74-4E4D-A821-3C88E9472CC1}" type="datetime1">
+            <a:fld id="{363CC327-5D43-564A-AE54-79308E5C447F}" type="datetime1">
               <a:rPr lang="en-US" smtClean="0"/>
               <a:t>6/6/16</a:t>
             </a:fld>
@@ -1744,10 +1728,6 @@
           <a:bodyPr/>
           <a:lstStyle/>
           <a:p>
-            <a:r>
-              <a:rPr lang="en-US" smtClean="0"/>
-              <a:t>https://github.com/StoneyJackson/git-ccscne-2016</a:t>
-            </a:r>
             <a:endParaRPr lang="en-US"/>
           </a:p>
         </p:txBody>
@@ -2013,7 +1993,7 @@
           <a:bodyPr/>
           <a:lstStyle/>
           <a:p>
-            <a:fld id="{73986AAE-8C50-5B43-B84E-A2C597837A88}" type="datetime1">
+            <a:fld id="{7DE42D0E-7782-CB4E-9F07-66D8D42C75F1}" type="datetime1">
               <a:rPr lang="en-US" smtClean="0"/>
               <a:t>6/6/16</a:t>
             </a:fld>
@@ -2036,10 +2016,6 @@
           <a:bodyPr/>
           <a:lstStyle/>
           <a:p>
-            <a:r>
-              <a:rPr lang="en-US" smtClean="0"/>
-              <a:t>https://github.com/StoneyJackson/git-ccscne-2016</a:t>
-            </a:r>
             <a:endParaRPr lang="en-US"/>
           </a:p>
         </p:txBody>
@@ -2439,7 +2415,7 @@
           <a:bodyPr/>
           <a:lstStyle/>
           <a:p>
-            <a:fld id="{119A46C2-57D2-EB4B-AB04-C30A49813490}" type="datetime1">
+            <a:fld id="{8A315A09-4495-A64C-B352-7D3CB67BC26B}" type="datetime1">
               <a:rPr lang="en-US" smtClean="0"/>
               <a:t>6/6/16</a:t>
             </a:fld>
@@ -2462,10 +2438,6 @@
           <a:bodyPr/>
           <a:lstStyle/>
           <a:p>
-            <a:r>
-              <a:rPr lang="en-US" smtClean="0"/>
-              <a:t>https://github.com/StoneyJackson/git-ccscne-2016</a:t>
-            </a:r>
             <a:endParaRPr lang="en-US"/>
           </a:p>
         </p:txBody>
@@ -2561,7 +2533,7 @@
           <a:bodyPr/>
           <a:lstStyle/>
           <a:p>
-            <a:fld id="{56F786E2-B885-D54E-9F4F-4C5442F065E0}" type="datetime1">
+            <a:fld id="{36ABAD06-32E2-C748-AF2E-D06EF969E7FA}" type="datetime1">
               <a:rPr lang="en-US" smtClean="0"/>
               <a:t>6/6/16</a:t>
             </a:fld>
@@ -2584,10 +2556,6 @@
           <a:bodyPr/>
           <a:lstStyle/>
           <a:p>
-            <a:r>
-              <a:rPr lang="en-US" smtClean="0"/>
-              <a:t>https://github.com/StoneyJackson/git-ccscne-2016</a:t>
-            </a:r>
             <a:endParaRPr lang="en-US"/>
           </a:p>
         </p:txBody>
@@ -2660,7 +2628,7 @@
           <a:bodyPr/>
           <a:lstStyle/>
           <a:p>
-            <a:fld id="{E9E382DA-9893-C247-B081-D905EFCB8494}" type="datetime1">
+            <a:fld id="{BAC54209-E09B-A94F-BD90-F93B40DD4647}" type="datetime1">
               <a:rPr lang="en-US" smtClean="0"/>
               <a:t>6/6/16</a:t>
             </a:fld>
@@ -2683,10 +2651,6 @@
           <a:bodyPr/>
           <a:lstStyle/>
           <a:p>
-            <a:r>
-              <a:rPr lang="en-US" smtClean="0"/>
-              <a:t>https://github.com/StoneyJackson/git-ccscne-2016</a:t>
-            </a:r>
             <a:endParaRPr lang="en-US"/>
           </a:p>
         </p:txBody>
@@ -2941,7 +2905,7 @@
           <a:bodyPr/>
           <a:lstStyle/>
           <a:p>
-            <a:fld id="{9D226C6B-DC99-2B4D-ABED-ECE84241F6C4}" type="datetime1">
+            <a:fld id="{9A488A7C-F951-9448-A701-9DCE680DE259}" type="datetime1">
               <a:rPr lang="en-US" smtClean="0"/>
               <a:t>6/6/16</a:t>
             </a:fld>
@@ -2964,10 +2928,6 @@
           <a:bodyPr/>
           <a:lstStyle/>
           <a:p>
-            <a:r>
-              <a:rPr lang="en-US" smtClean="0"/>
-              <a:t>https://github.com/StoneyJackson/git-ccscne-2016</a:t>
-            </a:r>
             <a:endParaRPr lang="en-US"/>
           </a:p>
         </p:txBody>
@@ -3198,7 +3158,7 @@
           <a:bodyPr/>
           <a:lstStyle/>
           <a:p>
-            <a:fld id="{DCD31B3C-16A4-8642-90BE-BFC0261D2C33}" type="datetime1">
+            <a:fld id="{85FF7565-78B0-2649-BE2B-CA43C1EB355B}" type="datetime1">
               <a:rPr lang="en-US" smtClean="0"/>
               <a:t>6/6/16</a:t>
             </a:fld>
@@ -3221,10 +3181,6 @@
           <a:bodyPr/>
           <a:lstStyle/>
           <a:p>
-            <a:r>
-              <a:rPr lang="en-US" smtClean="0"/>
-              <a:t>https://github.com/StoneyJackson/git-ccscne-2016</a:t>
-            </a:r>
             <a:endParaRPr lang="en-US"/>
           </a:p>
         </p:txBody>
@@ -3415,7 +3371,7 @@
             </a:lvl1pPr>
           </a:lstStyle>
           <a:p>
-            <a:fld id="{77DCCFEC-7971-7047-AB0C-FDB9B6FC5745}" type="datetime1">
+            <a:fld id="{B8147F35-C6B9-C94A-B58B-11496917C382}" type="datetime1">
               <a:rPr lang="en-US" smtClean="0"/>
               <a:t>6/6/16</a:t>
             </a:fld>
@@ -3456,10 +3412,6 @@
             </a:lvl1pPr>
           </a:lstStyle>
           <a:p>
-            <a:r>
-              <a:rPr lang="en-US" smtClean="0"/>
-              <a:t>https://github.com/StoneyJackson/git-ccscne-2016</a:t>
-            </a:r>
             <a:endParaRPr lang="en-US" dirty="0"/>
           </a:p>
         </p:txBody>
@@ -3551,7 +3503,7 @@
     <p:sldLayoutId id="2147483658" r:id="rId10"/>
     <p:sldLayoutId id="2147483659" r:id="rId11"/>
   </p:sldLayoutIdLst>
-  <p:hf hdr="0" dt="0"/>
+  <p:hf hdr="0" ftr="0" dt="0"/>
   <p:txStyles>
     <p:titleStyle>
       <a:lvl1pPr algn="ctr" defTabSz="457200" rtl="0" eaLnBrk="1" latinLnBrk="0" hangingPunct="1">
@@ -3914,45 +3866,6 @@
           </a:p>
         </p:txBody>
       </p:sp>
-      <p:sp>
-        <p:nvSpPr>
-          <p:cNvPr id="5" name="Footer Placeholder 4"/>
-          <p:cNvSpPr>
-            <a:spLocks noGrp="1"/>
-          </p:cNvSpPr>
-          <p:nvPr>
-            <p:ph type="ftr" sz="quarter" idx="11"/>
-          </p:nvPr>
-        </p:nvSpPr>
-        <p:spPr/>
-        <p:txBody>
-          <a:bodyPr/>
-          <a:lstStyle/>
-          <a:p>
-            <a:r>
-              <a:rPr lang="en-US" dirty="0" smtClean="0"/>
-              <a:t>https://</a:t>
-            </a:r>
-            <a:r>
-              <a:rPr lang="en-US" dirty="0" err="1" smtClean="0"/>
-              <a:t>github.com</a:t>
-            </a:r>
-            <a:r>
-              <a:rPr lang="en-US" dirty="0" smtClean="0"/>
-              <a:t>/</a:t>
-            </a:r>
-            <a:r>
-              <a:rPr lang="en-US" dirty="0" err="1" smtClean="0"/>
-              <a:t>StoneyJackson</a:t>
-            </a:r>
-            <a:r>
-              <a:rPr lang="en-US" dirty="0" smtClean="0"/>
-              <a:t>/git-ccscne-2016</a:t>
-            </a:r>
-            <a:endParaRPr lang="en-US" dirty="0"/>
-          </a:p>
-        </p:txBody>
-      </p:sp>
     </p:spTree>
     <p:extLst>
       <p:ext uri="{BB962C8B-B14F-4D97-AF65-F5344CB8AC3E}">
@@ -4437,29 +4350,6 @@
           </a:p>
         </p:txBody>
       </p:sp>
-      <p:sp>
-        <p:nvSpPr>
-          <p:cNvPr id="10" name="Footer Placeholder 9"/>
-          <p:cNvSpPr>
-            <a:spLocks noGrp="1"/>
-          </p:cNvSpPr>
-          <p:nvPr>
-            <p:ph type="ftr" sz="quarter" idx="11"/>
-          </p:nvPr>
-        </p:nvSpPr>
-        <p:spPr/>
-        <p:txBody>
-          <a:bodyPr/>
-          <a:lstStyle/>
-          <a:p>
-            <a:r>
-              <a:rPr lang="en-US" smtClean="0"/>
-              <a:t>https://github.com/StoneyJackson/git-ccscne-2016</a:t>
-            </a:r>
-            <a:endParaRPr lang="en-US"/>
-          </a:p>
-        </p:txBody>
-      </p:sp>
     </p:spTree>
     <p:extLst>
       <p:ext uri="{BB962C8B-B14F-4D97-AF65-F5344CB8AC3E}">
@@ -4988,29 +4878,6 @@
           </a:p>
         </p:txBody>
       </p:sp>
-      <p:sp>
-        <p:nvSpPr>
-          <p:cNvPr id="12" name="Footer Placeholder 11"/>
-          <p:cNvSpPr>
-            <a:spLocks noGrp="1"/>
-          </p:cNvSpPr>
-          <p:nvPr>
-            <p:ph type="ftr" sz="quarter" idx="11"/>
-          </p:nvPr>
-        </p:nvSpPr>
-        <p:spPr/>
-        <p:txBody>
-          <a:bodyPr/>
-          <a:lstStyle/>
-          <a:p>
-            <a:r>
-              <a:rPr lang="en-US" smtClean="0"/>
-              <a:t>https://github.com/StoneyJackson/git-ccscne-2016</a:t>
-            </a:r>
-            <a:endParaRPr lang="en-US"/>
-          </a:p>
-        </p:txBody>
-      </p:sp>
     </p:spTree>
     <p:extLst>
       <p:ext uri="{BB962C8B-B14F-4D97-AF65-F5344CB8AC3E}">
@@ -5577,29 +5444,6 @@
           </a:p>
         </p:txBody>
       </p:sp>
-      <p:sp>
-        <p:nvSpPr>
-          <p:cNvPr id="12" name="Footer Placeholder 11"/>
-          <p:cNvSpPr>
-            <a:spLocks noGrp="1"/>
-          </p:cNvSpPr>
-          <p:nvPr>
-            <p:ph type="ftr" sz="quarter" idx="11"/>
-          </p:nvPr>
-        </p:nvSpPr>
-        <p:spPr/>
-        <p:txBody>
-          <a:bodyPr/>
-          <a:lstStyle/>
-          <a:p>
-            <a:r>
-              <a:rPr lang="en-US" smtClean="0"/>
-              <a:t>https://github.com/StoneyJackson/git-ccscne-2016</a:t>
-            </a:r>
-            <a:endParaRPr lang="en-US"/>
-          </a:p>
-        </p:txBody>
-      </p:sp>
     </p:spTree>
     <p:extLst>
       <p:ext uri="{BB962C8B-B14F-4D97-AF65-F5344CB8AC3E}">
@@ -6206,29 +6050,6 @@
           </a:p>
         </p:txBody>
       </p:sp>
-      <p:sp>
-        <p:nvSpPr>
-          <p:cNvPr id="12" name="Footer Placeholder 11"/>
-          <p:cNvSpPr>
-            <a:spLocks noGrp="1"/>
-          </p:cNvSpPr>
-          <p:nvPr>
-            <p:ph type="ftr" sz="quarter" idx="11"/>
-          </p:nvPr>
-        </p:nvSpPr>
-        <p:spPr/>
-        <p:txBody>
-          <a:bodyPr/>
-          <a:lstStyle/>
-          <a:p>
-            <a:r>
-              <a:rPr lang="en-US" smtClean="0"/>
-              <a:t>https://github.com/StoneyJackson/git-ccscne-2016</a:t>
-            </a:r>
-            <a:endParaRPr lang="en-US"/>
-          </a:p>
-        </p:txBody>
-      </p:sp>
     </p:spTree>
     <p:extLst>
       <p:ext uri="{BB962C8B-B14F-4D97-AF65-F5344CB8AC3E}">
@@ -6873,29 +6694,6 @@
           </a:p>
         </p:txBody>
       </p:sp>
-      <p:sp>
-        <p:nvSpPr>
-          <p:cNvPr id="12" name="Footer Placeholder 11"/>
-          <p:cNvSpPr>
-            <a:spLocks noGrp="1"/>
-          </p:cNvSpPr>
-          <p:nvPr>
-            <p:ph type="ftr" sz="quarter" idx="11"/>
-          </p:nvPr>
-        </p:nvSpPr>
-        <p:spPr/>
-        <p:txBody>
-          <a:bodyPr/>
-          <a:lstStyle/>
-          <a:p>
-            <a:r>
-              <a:rPr lang="en-US" smtClean="0"/>
-              <a:t>https://github.com/StoneyJackson/git-ccscne-2016</a:t>
-            </a:r>
-            <a:endParaRPr lang="en-US"/>
-          </a:p>
-        </p:txBody>
-      </p:sp>
     </p:spTree>
     <p:extLst>
       <p:ext uri="{BB962C8B-B14F-4D97-AF65-F5344CB8AC3E}">
@@ -7494,29 +7292,6 @@
           </a:p>
         </p:txBody>
       </p:sp>
-      <p:sp>
-        <p:nvSpPr>
-          <p:cNvPr id="10" name="Footer Placeholder 9"/>
-          <p:cNvSpPr>
-            <a:spLocks noGrp="1"/>
-          </p:cNvSpPr>
-          <p:nvPr>
-            <p:ph type="ftr" sz="quarter" idx="11"/>
-          </p:nvPr>
-        </p:nvSpPr>
-        <p:spPr/>
-        <p:txBody>
-          <a:bodyPr/>
-          <a:lstStyle/>
-          <a:p>
-            <a:r>
-              <a:rPr lang="en-US" smtClean="0"/>
-              <a:t>https://github.com/StoneyJackson/git-ccscne-2016</a:t>
-            </a:r>
-            <a:endParaRPr lang="en-US"/>
-          </a:p>
-        </p:txBody>
-      </p:sp>
     </p:spTree>
     <p:extLst>
       <p:ext uri="{BB962C8B-B14F-4D97-AF65-F5344CB8AC3E}">
@@ -8157,29 +7932,6 @@
           </a:p>
         </p:txBody>
       </p:sp>
-      <p:sp>
-        <p:nvSpPr>
-          <p:cNvPr id="12" name="Footer Placeholder 11"/>
-          <p:cNvSpPr>
-            <a:spLocks noGrp="1"/>
-          </p:cNvSpPr>
-          <p:nvPr>
-            <p:ph type="ftr" sz="quarter" idx="11"/>
-          </p:nvPr>
-        </p:nvSpPr>
-        <p:spPr/>
-        <p:txBody>
-          <a:bodyPr/>
-          <a:lstStyle/>
-          <a:p>
-            <a:r>
-              <a:rPr lang="en-US" smtClean="0"/>
-              <a:t>https://github.com/StoneyJackson/git-ccscne-2016</a:t>
-            </a:r>
-            <a:endParaRPr lang="en-US"/>
-          </a:p>
-        </p:txBody>
-      </p:sp>
     </p:spTree>
     <p:extLst>
       <p:ext uri="{BB962C8B-B14F-4D97-AF65-F5344CB8AC3E}">
@@ -8896,29 +8648,6 @@
           </a:p>
         </p:txBody>
       </p:sp>
-      <p:sp>
-        <p:nvSpPr>
-          <p:cNvPr id="10" name="Footer Placeholder 9"/>
-          <p:cNvSpPr>
-            <a:spLocks noGrp="1"/>
-          </p:cNvSpPr>
-          <p:nvPr>
-            <p:ph type="ftr" sz="quarter" idx="11"/>
-          </p:nvPr>
-        </p:nvSpPr>
-        <p:spPr/>
-        <p:txBody>
-          <a:bodyPr/>
-          <a:lstStyle/>
-          <a:p>
-            <a:r>
-              <a:rPr lang="en-US" smtClean="0"/>
-              <a:t>https://github.com/StoneyJackson/git-ccscne-2016</a:t>
-            </a:r>
-            <a:endParaRPr lang="en-US"/>
-          </a:p>
-        </p:txBody>
-      </p:sp>
     </p:spTree>
     <p:extLst>
       <p:ext uri="{BB962C8B-B14F-4D97-AF65-F5344CB8AC3E}">
@@ -9636,29 +9365,6 @@
           </a:p>
         </p:txBody>
       </p:sp>
-      <p:sp>
-        <p:nvSpPr>
-          <p:cNvPr id="12" name="Footer Placeholder 11"/>
-          <p:cNvSpPr>
-            <a:spLocks noGrp="1"/>
-          </p:cNvSpPr>
-          <p:nvPr>
-            <p:ph type="ftr" sz="quarter" idx="11"/>
-          </p:nvPr>
-        </p:nvSpPr>
-        <p:spPr/>
-        <p:txBody>
-          <a:bodyPr/>
-          <a:lstStyle/>
-          <a:p>
-            <a:r>
-              <a:rPr lang="en-US" smtClean="0"/>
-              <a:t>https://github.com/StoneyJackson/git-ccscne-2016</a:t>
-            </a:r>
-            <a:endParaRPr lang="en-US"/>
-          </a:p>
-        </p:txBody>
-      </p:sp>
     </p:spTree>
     <p:extLst>
       <p:ext uri="{BB962C8B-B14F-4D97-AF65-F5344CB8AC3E}">
@@ -10414,29 +10120,6 @@
           </a:p>
         </p:txBody>
       </p:sp>
-      <p:sp>
-        <p:nvSpPr>
-          <p:cNvPr id="12" name="Footer Placeholder 11"/>
-          <p:cNvSpPr>
-            <a:spLocks noGrp="1"/>
-          </p:cNvSpPr>
-          <p:nvPr>
-            <p:ph type="ftr" sz="quarter" idx="11"/>
-          </p:nvPr>
-        </p:nvSpPr>
-        <p:spPr/>
-        <p:txBody>
-          <a:bodyPr/>
-          <a:lstStyle/>
-          <a:p>
-            <a:r>
-              <a:rPr lang="en-US" smtClean="0"/>
-              <a:t>https://github.com/StoneyJackson/git-ccscne-2016</a:t>
-            </a:r>
-            <a:endParaRPr lang="en-US"/>
-          </a:p>
-        </p:txBody>
-      </p:sp>
     </p:spTree>
     <p:extLst>
       <p:ext uri="{BB962C8B-B14F-4D97-AF65-F5344CB8AC3E}">
@@ -10562,29 +10245,6 @@
           </a:p>
         </p:txBody>
       </p:sp>
-      <p:sp>
-        <p:nvSpPr>
-          <p:cNvPr id="5" name="Footer Placeholder 4"/>
-          <p:cNvSpPr>
-            <a:spLocks noGrp="1"/>
-          </p:cNvSpPr>
-          <p:nvPr>
-            <p:ph type="ftr" sz="quarter" idx="11"/>
-          </p:nvPr>
-        </p:nvSpPr>
-        <p:spPr/>
-        <p:txBody>
-          <a:bodyPr/>
-          <a:lstStyle/>
-          <a:p>
-            <a:r>
-              <a:rPr lang="en-US" smtClean="0"/>
-              <a:t>https://github.com/StoneyJackson/git-ccscne-2016</a:t>
-            </a:r>
-            <a:endParaRPr lang="en-US"/>
-          </a:p>
-        </p:txBody>
-      </p:sp>
     </p:spTree>
     <p:extLst>
       <p:ext uri="{BB962C8B-B14F-4D97-AF65-F5344CB8AC3E}">
@@ -10980,29 +10640,6 @@
           </a:p>
         </p:txBody>
       </p:sp>
-      <p:sp>
-        <p:nvSpPr>
-          <p:cNvPr id="3" name="Footer Placeholder 2"/>
-          <p:cNvSpPr>
-            <a:spLocks noGrp="1"/>
-          </p:cNvSpPr>
-          <p:nvPr>
-            <p:ph type="ftr" sz="quarter" idx="11"/>
-          </p:nvPr>
-        </p:nvSpPr>
-        <p:spPr/>
-        <p:txBody>
-          <a:bodyPr/>
-          <a:lstStyle/>
-          <a:p>
-            <a:r>
-              <a:rPr lang="en-US" smtClean="0"/>
-              <a:t>https://github.com/StoneyJackson/git-ccscne-2016</a:t>
-            </a:r>
-            <a:endParaRPr lang="en-US"/>
-          </a:p>
-        </p:txBody>
-      </p:sp>
     </p:spTree>
     <p:extLst>
       <p:ext uri="{BB962C8B-B14F-4D97-AF65-F5344CB8AC3E}">
@@ -11465,29 +11102,6 @@
           </a:p>
         </p:txBody>
       </p:sp>
-      <p:sp>
-        <p:nvSpPr>
-          <p:cNvPr id="3" name="Footer Placeholder 2"/>
-          <p:cNvSpPr>
-            <a:spLocks noGrp="1"/>
-          </p:cNvSpPr>
-          <p:nvPr>
-            <p:ph type="ftr" sz="quarter" idx="11"/>
-          </p:nvPr>
-        </p:nvSpPr>
-        <p:spPr/>
-        <p:txBody>
-          <a:bodyPr/>
-          <a:lstStyle/>
-          <a:p>
-            <a:r>
-              <a:rPr lang="en-US" smtClean="0"/>
-              <a:t>https://github.com/StoneyJackson/git-ccscne-2016</a:t>
-            </a:r>
-            <a:endParaRPr lang="en-US"/>
-          </a:p>
-        </p:txBody>
-      </p:sp>
     </p:spTree>
     <p:extLst>
       <p:ext uri="{BB962C8B-B14F-4D97-AF65-F5344CB8AC3E}">
@@ -12036,29 +11650,6 @@
           </a:p>
         </p:txBody>
       </p:sp>
-      <p:sp>
-        <p:nvSpPr>
-          <p:cNvPr id="3" name="Footer Placeholder 2"/>
-          <p:cNvSpPr>
-            <a:spLocks noGrp="1"/>
-          </p:cNvSpPr>
-          <p:nvPr>
-            <p:ph type="ftr" sz="quarter" idx="11"/>
-          </p:nvPr>
-        </p:nvSpPr>
-        <p:spPr/>
-        <p:txBody>
-          <a:bodyPr/>
-          <a:lstStyle/>
-          <a:p>
-            <a:r>
-              <a:rPr lang="en-US" smtClean="0"/>
-              <a:t>https://github.com/StoneyJackson/git-ccscne-2016</a:t>
-            </a:r>
-            <a:endParaRPr lang="en-US"/>
-          </a:p>
-        </p:txBody>
-      </p:sp>
     </p:spTree>
     <p:extLst>
       <p:ext uri="{BB962C8B-B14F-4D97-AF65-F5344CB8AC3E}">
@@ -12722,29 +12313,6 @@
           </a:p>
         </p:txBody>
       </p:sp>
-      <p:sp>
-        <p:nvSpPr>
-          <p:cNvPr id="3" name="Footer Placeholder 2"/>
-          <p:cNvSpPr>
-            <a:spLocks noGrp="1"/>
-          </p:cNvSpPr>
-          <p:nvPr>
-            <p:ph type="ftr" sz="quarter" idx="11"/>
-          </p:nvPr>
-        </p:nvSpPr>
-        <p:spPr/>
-        <p:txBody>
-          <a:bodyPr/>
-          <a:lstStyle/>
-          <a:p>
-            <a:r>
-              <a:rPr lang="en-US" smtClean="0"/>
-              <a:t>https://github.com/StoneyJackson/git-ccscne-2016</a:t>
-            </a:r>
-            <a:endParaRPr lang="en-US"/>
-          </a:p>
-        </p:txBody>
-      </p:sp>
     </p:spTree>
     <p:extLst>
       <p:ext uri="{BB962C8B-B14F-4D97-AF65-F5344CB8AC3E}">
@@ -13426,29 +12994,6 @@
           </a:p>
         </p:txBody>
       </p:sp>
-      <p:sp>
-        <p:nvSpPr>
-          <p:cNvPr id="3" name="Footer Placeholder 2"/>
-          <p:cNvSpPr>
-            <a:spLocks noGrp="1"/>
-          </p:cNvSpPr>
-          <p:nvPr>
-            <p:ph type="ftr" sz="quarter" idx="11"/>
-          </p:nvPr>
-        </p:nvSpPr>
-        <p:spPr/>
-        <p:txBody>
-          <a:bodyPr/>
-          <a:lstStyle/>
-          <a:p>
-            <a:r>
-              <a:rPr lang="en-US" smtClean="0"/>
-              <a:t>https://github.com/StoneyJackson/git-ccscne-2016</a:t>
-            </a:r>
-            <a:endParaRPr lang="en-US"/>
-          </a:p>
-        </p:txBody>
-      </p:sp>
     </p:spTree>
     <p:extLst>
       <p:ext uri="{BB962C8B-B14F-4D97-AF65-F5344CB8AC3E}">
@@ -14136,29 +13681,6 @@
           </a:p>
         </p:txBody>
       </p:sp>
-      <p:sp>
-        <p:nvSpPr>
-          <p:cNvPr id="4" name="Footer Placeholder 3"/>
-          <p:cNvSpPr>
-            <a:spLocks noGrp="1"/>
-          </p:cNvSpPr>
-          <p:nvPr>
-            <p:ph type="ftr" sz="quarter" idx="11"/>
-          </p:nvPr>
-        </p:nvSpPr>
-        <p:spPr/>
-        <p:txBody>
-          <a:bodyPr/>
-          <a:lstStyle/>
-          <a:p>
-            <a:r>
-              <a:rPr lang="en-US" smtClean="0"/>
-              <a:t>https://github.com/StoneyJackson/git-ccscne-2016</a:t>
-            </a:r>
-            <a:endParaRPr lang="en-US"/>
-          </a:p>
-        </p:txBody>
-      </p:sp>
     </p:spTree>
     <p:extLst>
       <p:ext uri="{BB962C8B-B14F-4D97-AF65-F5344CB8AC3E}">
@@ -14944,29 +14466,6 @@
           </a:p>
         </p:txBody>
       </p:sp>
-      <p:sp>
-        <p:nvSpPr>
-          <p:cNvPr id="3" name="Footer Placeholder 2"/>
-          <p:cNvSpPr>
-            <a:spLocks noGrp="1"/>
-          </p:cNvSpPr>
-          <p:nvPr>
-            <p:ph type="ftr" sz="quarter" idx="11"/>
-          </p:nvPr>
-        </p:nvSpPr>
-        <p:spPr/>
-        <p:txBody>
-          <a:bodyPr/>
-          <a:lstStyle/>
-          <a:p>
-            <a:r>
-              <a:rPr lang="en-US" smtClean="0"/>
-              <a:t>https://github.com/StoneyJackson/git-ccscne-2016</a:t>
-            </a:r>
-            <a:endParaRPr lang="en-US"/>
-          </a:p>
-        </p:txBody>
-      </p:sp>
     </p:spTree>
     <p:extLst>
       <p:ext uri="{BB962C8B-B14F-4D97-AF65-F5344CB8AC3E}">
@@ -15828,29 +15327,6 @@
           </a:p>
         </p:txBody>
       </p:sp>
-      <p:sp>
-        <p:nvSpPr>
-          <p:cNvPr id="3" name="Footer Placeholder 2"/>
-          <p:cNvSpPr>
-            <a:spLocks noGrp="1"/>
-          </p:cNvSpPr>
-          <p:nvPr>
-            <p:ph type="ftr" sz="quarter" idx="11"/>
-          </p:nvPr>
-        </p:nvSpPr>
-        <p:spPr/>
-        <p:txBody>
-          <a:bodyPr/>
-          <a:lstStyle/>
-          <a:p>
-            <a:r>
-              <a:rPr lang="en-US" smtClean="0"/>
-              <a:t>https://github.com/StoneyJackson/git-ccscne-2016</a:t>
-            </a:r>
-            <a:endParaRPr lang="en-US"/>
-          </a:p>
-        </p:txBody>
-      </p:sp>
     </p:spTree>
     <p:extLst>
       <p:ext uri="{BB962C8B-B14F-4D97-AF65-F5344CB8AC3E}">
@@ -16764,29 +16240,6 @@
           </a:p>
         </p:txBody>
       </p:sp>
-      <p:sp>
-        <p:nvSpPr>
-          <p:cNvPr id="3" name="Footer Placeholder 2"/>
-          <p:cNvSpPr>
-            <a:spLocks noGrp="1"/>
-          </p:cNvSpPr>
-          <p:nvPr>
-            <p:ph type="ftr" sz="quarter" idx="11"/>
-          </p:nvPr>
-        </p:nvSpPr>
-        <p:spPr/>
-        <p:txBody>
-          <a:bodyPr/>
-          <a:lstStyle/>
-          <a:p>
-            <a:r>
-              <a:rPr lang="en-US" smtClean="0"/>
-              <a:t>https://github.com/StoneyJackson/git-ccscne-2016</a:t>
-            </a:r>
-            <a:endParaRPr lang="en-US"/>
-          </a:p>
-        </p:txBody>
-      </p:sp>
     </p:spTree>
     <p:extLst>
       <p:ext uri="{BB962C8B-B14F-4D97-AF65-F5344CB8AC3E}">
@@ -17807,29 +17260,6 @@
           </a:p>
         </p:txBody>
       </p:sp>
-      <p:sp>
-        <p:nvSpPr>
-          <p:cNvPr id="3" name="Footer Placeholder 2"/>
-          <p:cNvSpPr>
-            <a:spLocks noGrp="1"/>
-          </p:cNvSpPr>
-          <p:nvPr>
-            <p:ph type="ftr" sz="quarter" idx="11"/>
-          </p:nvPr>
-        </p:nvSpPr>
-        <p:spPr/>
-        <p:txBody>
-          <a:bodyPr/>
-          <a:lstStyle/>
-          <a:p>
-            <a:r>
-              <a:rPr lang="en-US" smtClean="0"/>
-              <a:t>https://github.com/StoneyJackson/git-ccscne-2016</a:t>
-            </a:r>
-            <a:endParaRPr lang="en-US"/>
-          </a:p>
-        </p:txBody>
-      </p:sp>
     </p:spTree>
     <p:extLst>
       <p:ext uri="{BB962C8B-B14F-4D97-AF65-F5344CB8AC3E}">
@@ -18001,29 +17431,6 @@
           </a:p>
         </p:txBody>
       </p:sp>
-      <p:sp>
-        <p:nvSpPr>
-          <p:cNvPr id="6" name="Footer Placeholder 5"/>
-          <p:cNvSpPr>
-            <a:spLocks noGrp="1"/>
-          </p:cNvSpPr>
-          <p:nvPr>
-            <p:ph type="ftr" sz="quarter" idx="11"/>
-          </p:nvPr>
-        </p:nvSpPr>
-        <p:spPr/>
-        <p:txBody>
-          <a:bodyPr/>
-          <a:lstStyle/>
-          <a:p>
-            <a:r>
-              <a:rPr lang="en-US" smtClean="0"/>
-              <a:t>https://github.com/StoneyJackson/git-ccscne-2016</a:t>
-            </a:r>
-            <a:endParaRPr lang="en-US"/>
-          </a:p>
-        </p:txBody>
-      </p:sp>
     </p:spTree>
     <p:extLst>
       <p:ext uri="{BB962C8B-B14F-4D97-AF65-F5344CB8AC3E}">
@@ -19239,29 +18646,6 @@
           </a:p>
         </p:txBody>
       </p:sp>
-      <p:sp>
-        <p:nvSpPr>
-          <p:cNvPr id="3" name="Footer Placeholder 2"/>
-          <p:cNvSpPr>
-            <a:spLocks noGrp="1"/>
-          </p:cNvSpPr>
-          <p:nvPr>
-            <p:ph type="ftr" sz="quarter" idx="11"/>
-          </p:nvPr>
-        </p:nvSpPr>
-        <p:spPr/>
-        <p:txBody>
-          <a:bodyPr/>
-          <a:lstStyle/>
-          <a:p>
-            <a:r>
-              <a:rPr lang="en-US" smtClean="0"/>
-              <a:t>https://github.com/StoneyJackson/git-ccscne-2016</a:t>
-            </a:r>
-            <a:endParaRPr lang="en-US"/>
-          </a:p>
-        </p:txBody>
-      </p:sp>
     </p:spTree>
     <p:extLst>
       <p:ext uri="{BB962C8B-B14F-4D97-AF65-F5344CB8AC3E}">
@@ -20255,29 +19639,6 @@
           </a:p>
         </p:txBody>
       </p:sp>
-      <p:sp>
-        <p:nvSpPr>
-          <p:cNvPr id="3" name="Footer Placeholder 2"/>
-          <p:cNvSpPr>
-            <a:spLocks noGrp="1"/>
-          </p:cNvSpPr>
-          <p:nvPr>
-            <p:ph type="ftr" sz="quarter" idx="11"/>
-          </p:nvPr>
-        </p:nvSpPr>
-        <p:spPr/>
-        <p:txBody>
-          <a:bodyPr/>
-          <a:lstStyle/>
-          <a:p>
-            <a:r>
-              <a:rPr lang="en-US" smtClean="0"/>
-              <a:t>https://github.com/StoneyJackson/git-ccscne-2016</a:t>
-            </a:r>
-            <a:endParaRPr lang="en-US"/>
-          </a:p>
-        </p:txBody>
-      </p:sp>
     </p:spTree>
     <p:extLst>
       <p:ext uri="{BB962C8B-B14F-4D97-AF65-F5344CB8AC3E}">
@@ -21347,29 +20708,6 @@
           </a:p>
         </p:txBody>
       </p:sp>
-      <p:sp>
-        <p:nvSpPr>
-          <p:cNvPr id="3" name="Footer Placeholder 2"/>
-          <p:cNvSpPr>
-            <a:spLocks noGrp="1"/>
-          </p:cNvSpPr>
-          <p:nvPr>
-            <p:ph type="ftr" sz="quarter" idx="11"/>
-          </p:nvPr>
-        </p:nvSpPr>
-        <p:spPr/>
-        <p:txBody>
-          <a:bodyPr/>
-          <a:lstStyle/>
-          <a:p>
-            <a:r>
-              <a:rPr lang="en-US" smtClean="0"/>
-              <a:t>https://github.com/StoneyJackson/git-ccscne-2016</a:t>
-            </a:r>
-            <a:endParaRPr lang="en-US"/>
-          </a:p>
-        </p:txBody>
-      </p:sp>
     </p:spTree>
     <p:extLst>
       <p:ext uri="{BB962C8B-B14F-4D97-AF65-F5344CB8AC3E}">
@@ -22436,29 +21774,6 @@
           </a:p>
         </p:txBody>
       </p:sp>
-      <p:sp>
-        <p:nvSpPr>
-          <p:cNvPr id="3" name="Footer Placeholder 2"/>
-          <p:cNvSpPr>
-            <a:spLocks noGrp="1"/>
-          </p:cNvSpPr>
-          <p:nvPr>
-            <p:ph type="ftr" sz="quarter" idx="11"/>
-          </p:nvPr>
-        </p:nvSpPr>
-        <p:spPr/>
-        <p:txBody>
-          <a:bodyPr/>
-          <a:lstStyle/>
-          <a:p>
-            <a:r>
-              <a:rPr lang="en-US" smtClean="0"/>
-              <a:t>https://github.com/StoneyJackson/git-ccscne-2016</a:t>
-            </a:r>
-            <a:endParaRPr lang="en-US"/>
-          </a:p>
-        </p:txBody>
-      </p:sp>
     </p:spTree>
     <p:extLst>
       <p:ext uri="{BB962C8B-B14F-4D97-AF65-F5344CB8AC3E}">
@@ -23610,29 +22925,6 @@
           </a:p>
         </p:txBody>
       </p:sp>
-      <p:sp>
-        <p:nvSpPr>
-          <p:cNvPr id="3" name="Footer Placeholder 2"/>
-          <p:cNvSpPr>
-            <a:spLocks noGrp="1"/>
-          </p:cNvSpPr>
-          <p:nvPr>
-            <p:ph type="ftr" sz="quarter" idx="11"/>
-          </p:nvPr>
-        </p:nvSpPr>
-        <p:spPr/>
-        <p:txBody>
-          <a:bodyPr/>
-          <a:lstStyle/>
-          <a:p>
-            <a:r>
-              <a:rPr lang="en-US" smtClean="0"/>
-              <a:t>https://github.com/StoneyJackson/git-ccscne-2016</a:t>
-            </a:r>
-            <a:endParaRPr lang="en-US"/>
-          </a:p>
-        </p:txBody>
-      </p:sp>
     </p:spTree>
     <p:extLst>
       <p:ext uri="{BB962C8B-B14F-4D97-AF65-F5344CB8AC3E}">
@@ -24636,29 +23928,6 @@
           </a:p>
         </p:txBody>
       </p:sp>
-      <p:sp>
-        <p:nvSpPr>
-          <p:cNvPr id="3" name="Footer Placeholder 2"/>
-          <p:cNvSpPr>
-            <a:spLocks noGrp="1"/>
-          </p:cNvSpPr>
-          <p:nvPr>
-            <p:ph type="ftr" sz="quarter" idx="11"/>
-          </p:nvPr>
-        </p:nvSpPr>
-        <p:spPr/>
-        <p:txBody>
-          <a:bodyPr/>
-          <a:lstStyle/>
-          <a:p>
-            <a:r>
-              <a:rPr lang="en-US" smtClean="0"/>
-              <a:t>https://github.com/StoneyJackson/git-ccscne-2016</a:t>
-            </a:r>
-            <a:endParaRPr lang="en-US"/>
-          </a:p>
-        </p:txBody>
-      </p:sp>
     </p:spTree>
     <p:extLst>
       <p:ext uri="{BB962C8B-B14F-4D97-AF65-F5344CB8AC3E}">
@@ -25662,29 +24931,6 @@
           </a:p>
         </p:txBody>
       </p:sp>
-      <p:sp>
-        <p:nvSpPr>
-          <p:cNvPr id="3" name="Footer Placeholder 2"/>
-          <p:cNvSpPr>
-            <a:spLocks noGrp="1"/>
-          </p:cNvSpPr>
-          <p:nvPr>
-            <p:ph type="ftr" sz="quarter" idx="11"/>
-          </p:nvPr>
-        </p:nvSpPr>
-        <p:spPr/>
-        <p:txBody>
-          <a:bodyPr/>
-          <a:lstStyle/>
-          <a:p>
-            <a:r>
-              <a:rPr lang="en-US" smtClean="0"/>
-              <a:t>https://github.com/StoneyJackson/git-ccscne-2016</a:t>
-            </a:r>
-            <a:endParaRPr lang="en-US"/>
-          </a:p>
-        </p:txBody>
-      </p:sp>
     </p:spTree>
     <p:extLst>
       <p:ext uri="{BB962C8B-B14F-4D97-AF65-F5344CB8AC3E}">
@@ -26612,29 +25858,6 @@
           </a:p>
         </p:txBody>
       </p:sp>
-      <p:sp>
-        <p:nvSpPr>
-          <p:cNvPr id="3" name="Footer Placeholder 2"/>
-          <p:cNvSpPr>
-            <a:spLocks noGrp="1"/>
-          </p:cNvSpPr>
-          <p:nvPr>
-            <p:ph type="ftr" sz="quarter" idx="11"/>
-          </p:nvPr>
-        </p:nvSpPr>
-        <p:spPr/>
-        <p:txBody>
-          <a:bodyPr/>
-          <a:lstStyle/>
-          <a:p>
-            <a:r>
-              <a:rPr lang="en-US" smtClean="0"/>
-              <a:t>https://github.com/StoneyJackson/git-ccscne-2016</a:t>
-            </a:r>
-            <a:endParaRPr lang="en-US"/>
-          </a:p>
-        </p:txBody>
-      </p:sp>
     </p:spTree>
     <p:extLst>
       <p:ext uri="{BB962C8B-B14F-4D97-AF65-F5344CB8AC3E}">
@@ -27538,29 +26761,6 @@
           </a:p>
         </p:txBody>
       </p:sp>
-      <p:sp>
-        <p:nvSpPr>
-          <p:cNvPr id="4" name="Footer Placeholder 3"/>
-          <p:cNvSpPr>
-            <a:spLocks noGrp="1"/>
-          </p:cNvSpPr>
-          <p:nvPr>
-            <p:ph type="ftr" sz="quarter" idx="11"/>
-          </p:nvPr>
-        </p:nvSpPr>
-        <p:spPr/>
-        <p:txBody>
-          <a:bodyPr/>
-          <a:lstStyle/>
-          <a:p>
-            <a:r>
-              <a:rPr lang="en-US" smtClean="0"/>
-              <a:t>https://github.com/StoneyJackson/git-ccscne-2016</a:t>
-            </a:r>
-            <a:endParaRPr lang="en-US"/>
-          </a:p>
-        </p:txBody>
-      </p:sp>
     </p:spTree>
     <p:extLst>
       <p:ext uri="{BB962C8B-B14F-4D97-AF65-F5344CB8AC3E}">
@@ -28462,29 +27662,6 @@
           </a:p>
         </p:txBody>
       </p:sp>
-      <p:sp>
-        <p:nvSpPr>
-          <p:cNvPr id="3" name="Footer Placeholder 2"/>
-          <p:cNvSpPr>
-            <a:spLocks noGrp="1"/>
-          </p:cNvSpPr>
-          <p:nvPr>
-            <p:ph type="ftr" sz="quarter" idx="11"/>
-          </p:nvPr>
-        </p:nvSpPr>
-        <p:spPr/>
-        <p:txBody>
-          <a:bodyPr/>
-          <a:lstStyle/>
-          <a:p>
-            <a:r>
-              <a:rPr lang="en-US" smtClean="0"/>
-              <a:t>https://github.com/StoneyJackson/git-ccscne-2016</a:t>
-            </a:r>
-            <a:endParaRPr lang="en-US"/>
-          </a:p>
-        </p:txBody>
-      </p:sp>
     </p:spTree>
     <p:extLst>
       <p:ext uri="{BB962C8B-B14F-4D97-AF65-F5344CB8AC3E}">
@@ -28701,29 +27878,6 @@
               <a:rPr lang="en-US" smtClean="0"/>
               <a:t>4</a:t>
             </a:fld>
-            <a:endParaRPr lang="en-US"/>
-          </a:p>
-        </p:txBody>
-      </p:sp>
-      <p:sp>
-        <p:nvSpPr>
-          <p:cNvPr id="5" name="Footer Placeholder 4"/>
-          <p:cNvSpPr>
-            <a:spLocks noGrp="1"/>
-          </p:cNvSpPr>
-          <p:nvPr>
-            <p:ph type="ftr" sz="quarter" idx="11"/>
-          </p:nvPr>
-        </p:nvSpPr>
-        <p:spPr/>
-        <p:txBody>
-          <a:bodyPr/>
-          <a:lstStyle/>
-          <a:p>
-            <a:r>
-              <a:rPr lang="en-US" smtClean="0"/>
-              <a:t>https://github.com/StoneyJackson/git-ccscne-2016</a:t>
-            </a:r>
             <a:endParaRPr lang="en-US"/>
           </a:p>
         </p:txBody>
@@ -29798,29 +28952,6 @@
           </a:p>
         </p:txBody>
       </p:sp>
-      <p:sp>
-        <p:nvSpPr>
-          <p:cNvPr id="3" name="Footer Placeholder 2"/>
-          <p:cNvSpPr>
-            <a:spLocks noGrp="1"/>
-          </p:cNvSpPr>
-          <p:nvPr>
-            <p:ph type="ftr" sz="quarter" idx="11"/>
-          </p:nvPr>
-        </p:nvSpPr>
-        <p:spPr/>
-        <p:txBody>
-          <a:bodyPr/>
-          <a:lstStyle/>
-          <a:p>
-            <a:r>
-              <a:rPr lang="en-US" smtClean="0"/>
-              <a:t>https://github.com/StoneyJackson/git-ccscne-2016</a:t>
-            </a:r>
-            <a:endParaRPr lang="en-US"/>
-          </a:p>
-        </p:txBody>
-      </p:sp>
     </p:spTree>
     <p:extLst>
       <p:ext uri="{BB962C8B-B14F-4D97-AF65-F5344CB8AC3E}">
@@ -30884,29 +30015,6 @@
           </a:p>
         </p:txBody>
       </p:sp>
-      <p:sp>
-        <p:nvSpPr>
-          <p:cNvPr id="3" name="Footer Placeholder 2"/>
-          <p:cNvSpPr>
-            <a:spLocks noGrp="1"/>
-          </p:cNvSpPr>
-          <p:nvPr>
-            <p:ph type="ftr" sz="quarter" idx="11"/>
-          </p:nvPr>
-        </p:nvSpPr>
-        <p:spPr/>
-        <p:txBody>
-          <a:bodyPr/>
-          <a:lstStyle/>
-          <a:p>
-            <a:r>
-              <a:rPr lang="en-US" smtClean="0"/>
-              <a:t>https://github.com/StoneyJackson/git-ccscne-2016</a:t>
-            </a:r>
-            <a:endParaRPr lang="en-US"/>
-          </a:p>
-        </p:txBody>
-      </p:sp>
     </p:spTree>
     <p:extLst>
       <p:ext uri="{BB962C8B-B14F-4D97-AF65-F5344CB8AC3E}">
@@ -31966,29 +31074,6 @@
           </a:p>
         </p:txBody>
       </p:sp>
-      <p:sp>
-        <p:nvSpPr>
-          <p:cNvPr id="3" name="Footer Placeholder 2"/>
-          <p:cNvSpPr>
-            <a:spLocks noGrp="1"/>
-          </p:cNvSpPr>
-          <p:nvPr>
-            <p:ph type="ftr" sz="quarter" idx="11"/>
-          </p:nvPr>
-        </p:nvSpPr>
-        <p:spPr/>
-        <p:txBody>
-          <a:bodyPr/>
-          <a:lstStyle/>
-          <a:p>
-            <a:r>
-              <a:rPr lang="en-US" smtClean="0"/>
-              <a:t>https://github.com/StoneyJackson/git-ccscne-2016</a:t>
-            </a:r>
-            <a:endParaRPr lang="en-US"/>
-          </a:p>
-        </p:txBody>
-      </p:sp>
     </p:spTree>
     <p:extLst>
       <p:ext uri="{BB962C8B-B14F-4D97-AF65-F5344CB8AC3E}">
@@ -32990,29 +32075,6 @@
           </a:p>
         </p:txBody>
       </p:sp>
-      <p:sp>
-        <p:nvSpPr>
-          <p:cNvPr id="3" name="Footer Placeholder 2"/>
-          <p:cNvSpPr>
-            <a:spLocks noGrp="1"/>
-          </p:cNvSpPr>
-          <p:nvPr>
-            <p:ph type="ftr" sz="quarter" idx="11"/>
-          </p:nvPr>
-        </p:nvSpPr>
-        <p:spPr/>
-        <p:txBody>
-          <a:bodyPr/>
-          <a:lstStyle/>
-          <a:p>
-            <a:r>
-              <a:rPr lang="en-US" smtClean="0"/>
-              <a:t>https://github.com/StoneyJackson/git-ccscne-2016</a:t>
-            </a:r>
-            <a:endParaRPr lang="en-US"/>
-          </a:p>
-        </p:txBody>
-      </p:sp>
     </p:spTree>
     <p:extLst>
       <p:ext uri="{BB962C8B-B14F-4D97-AF65-F5344CB8AC3E}">
@@ -33147,29 +32209,6 @@
       </p:sp>
       <p:sp>
         <p:nvSpPr>
-          <p:cNvPr id="4" name="Footer Placeholder 3"/>
-          <p:cNvSpPr>
-            <a:spLocks noGrp="1"/>
-          </p:cNvSpPr>
-          <p:nvPr>
-            <p:ph type="ftr" sz="quarter" idx="11"/>
-          </p:nvPr>
-        </p:nvSpPr>
-        <p:spPr/>
-        <p:txBody>
-          <a:bodyPr/>
-          <a:lstStyle/>
-          <a:p>
-            <a:r>
-              <a:rPr lang="en-US" smtClean="0"/>
-              <a:t>https://github.com/StoneyJackson/git-ccscne-2016</a:t>
-            </a:r>
-            <a:endParaRPr lang="en-US"/>
-          </a:p>
-        </p:txBody>
-      </p:sp>
-      <p:sp>
-        <p:nvSpPr>
           <p:cNvPr id="5" name="Slide Number Placeholder 4"/>
           <p:cNvSpPr>
             <a:spLocks noGrp="1"/>
@@ -33306,29 +32345,6 @@
               <a:t>Referenced by activity</a:t>
             </a:r>
             <a:endParaRPr lang="en-US" dirty="0"/>
-          </a:p>
-        </p:txBody>
-      </p:sp>
-      <p:sp>
-        <p:nvSpPr>
-          <p:cNvPr id="4" name="Footer Placeholder 3"/>
-          <p:cNvSpPr>
-            <a:spLocks noGrp="1"/>
-          </p:cNvSpPr>
-          <p:nvPr>
-            <p:ph type="ftr" sz="quarter" idx="11"/>
-          </p:nvPr>
-        </p:nvSpPr>
-        <p:spPr/>
-        <p:txBody>
-          <a:bodyPr/>
-          <a:lstStyle/>
-          <a:p>
-            <a:r>
-              <a:rPr lang="en-US" smtClean="0"/>
-              <a:t>https://github.com/StoneyJackson/git-ccscne-2016</a:t>
-            </a:r>
-            <a:endParaRPr lang="en-US"/>
           </a:p>
         </p:txBody>
       </p:sp>
@@ -34492,29 +33508,6 @@
           </a:p>
         </p:txBody>
       </p:sp>
-      <p:sp>
-        <p:nvSpPr>
-          <p:cNvPr id="2" name="Footer Placeholder 1"/>
-          <p:cNvSpPr>
-            <a:spLocks noGrp="1"/>
-          </p:cNvSpPr>
-          <p:nvPr>
-            <p:ph type="ftr" sz="quarter" idx="11"/>
-          </p:nvPr>
-        </p:nvSpPr>
-        <p:spPr/>
-        <p:txBody>
-          <a:bodyPr/>
-          <a:lstStyle/>
-          <a:p>
-            <a:r>
-              <a:rPr lang="en-US" smtClean="0"/>
-              <a:t>https://github.com/StoneyJackson/git-ccscne-2016</a:t>
-            </a:r>
-            <a:endParaRPr lang="en-US"/>
-          </a:p>
-        </p:txBody>
-      </p:sp>
     </p:spTree>
     <p:extLst>
       <p:ext uri="{BB962C8B-B14F-4D97-AF65-F5344CB8AC3E}">
@@ -34666,29 +33659,6 @@
               <a:t>http://creativecommons.org/licenses/by-sa/4.0/</a:t>
             </a:r>
             <a:endParaRPr lang="en-US" sz="1400" dirty="0"/>
-          </a:p>
-        </p:txBody>
-      </p:sp>
-      <p:sp>
-        <p:nvSpPr>
-          <p:cNvPr id="4" name="Footer Placeholder 3"/>
-          <p:cNvSpPr>
-            <a:spLocks noGrp="1"/>
-          </p:cNvSpPr>
-          <p:nvPr>
-            <p:ph type="ftr" sz="quarter" idx="11"/>
-          </p:nvPr>
-        </p:nvSpPr>
-        <p:spPr/>
-        <p:txBody>
-          <a:bodyPr/>
-          <a:lstStyle/>
-          <a:p>
-            <a:r>
-              <a:rPr lang="en-US" smtClean="0"/>
-              <a:t>https://github.com/StoneyJackson/git-ccscne-2016</a:t>
-            </a:r>
-            <a:endParaRPr lang="en-US"/>
           </a:p>
         </p:txBody>
       </p:sp>
@@ -35139,29 +34109,6 @@
           </a:p>
         </p:txBody>
       </p:sp>
-      <p:sp>
-        <p:nvSpPr>
-          <p:cNvPr id="5" name="Footer Placeholder 4"/>
-          <p:cNvSpPr>
-            <a:spLocks noGrp="1"/>
-          </p:cNvSpPr>
-          <p:nvPr>
-            <p:ph type="ftr" sz="quarter" idx="11"/>
-          </p:nvPr>
-        </p:nvSpPr>
-        <p:spPr/>
-        <p:txBody>
-          <a:bodyPr/>
-          <a:lstStyle/>
-          <a:p>
-            <a:r>
-              <a:rPr lang="en-US" smtClean="0"/>
-              <a:t>https://github.com/StoneyJackson/git-ccscne-2016</a:t>
-            </a:r>
-            <a:endParaRPr lang="en-US"/>
-          </a:p>
-        </p:txBody>
-      </p:sp>
     </p:spTree>
     <p:extLst>
       <p:ext uri="{BB962C8B-B14F-4D97-AF65-F5344CB8AC3E}">
@@ -35469,29 +34416,6 @@
           </a:p>
         </p:txBody>
       </p:sp>
-      <p:sp>
-        <p:nvSpPr>
-          <p:cNvPr id="5" name="Footer Placeholder 4"/>
-          <p:cNvSpPr>
-            <a:spLocks noGrp="1"/>
-          </p:cNvSpPr>
-          <p:nvPr>
-            <p:ph type="ftr" sz="quarter" idx="11"/>
-          </p:nvPr>
-        </p:nvSpPr>
-        <p:spPr/>
-        <p:txBody>
-          <a:bodyPr/>
-          <a:lstStyle/>
-          <a:p>
-            <a:r>
-              <a:rPr lang="en-US" smtClean="0"/>
-              <a:t>https://github.com/StoneyJackson/git-ccscne-2016</a:t>
-            </a:r>
-            <a:endParaRPr lang="en-US"/>
-          </a:p>
-        </p:txBody>
-      </p:sp>
     </p:spTree>
     <p:extLst>
       <p:ext uri="{BB962C8B-B14F-4D97-AF65-F5344CB8AC3E}">
@@ -35845,29 +34769,6 @@
               <a:rPr lang="en-US" smtClean="0"/>
               <a:t>7</a:t>
             </a:fld>
-            <a:endParaRPr lang="en-US"/>
-          </a:p>
-        </p:txBody>
-      </p:sp>
-      <p:sp>
-        <p:nvSpPr>
-          <p:cNvPr id="5" name="Footer Placeholder 4"/>
-          <p:cNvSpPr>
-            <a:spLocks noGrp="1"/>
-          </p:cNvSpPr>
-          <p:nvPr>
-            <p:ph type="ftr" sz="quarter" idx="11"/>
-          </p:nvPr>
-        </p:nvSpPr>
-        <p:spPr/>
-        <p:txBody>
-          <a:bodyPr/>
-          <a:lstStyle/>
-          <a:p>
-            <a:r>
-              <a:rPr lang="en-US" smtClean="0"/>
-              <a:t>https://github.com/StoneyJackson/git-ccscne-2016</a:t>
-            </a:r>
             <a:endParaRPr lang="en-US"/>
           </a:p>
         </p:txBody>
@@ -36349,29 +35250,6 @@
           </a:p>
         </p:txBody>
       </p:sp>
-      <p:sp>
-        <p:nvSpPr>
-          <p:cNvPr id="10" name="Footer Placeholder 9"/>
-          <p:cNvSpPr>
-            <a:spLocks noGrp="1"/>
-          </p:cNvSpPr>
-          <p:nvPr>
-            <p:ph type="ftr" sz="quarter" idx="11"/>
-          </p:nvPr>
-        </p:nvSpPr>
-        <p:spPr/>
-        <p:txBody>
-          <a:bodyPr/>
-          <a:lstStyle/>
-          <a:p>
-            <a:r>
-              <a:rPr lang="en-US" smtClean="0"/>
-              <a:t>https://github.com/StoneyJackson/git-ccscne-2016</a:t>
-            </a:r>
-            <a:endParaRPr lang="en-US"/>
-          </a:p>
-        </p:txBody>
-      </p:sp>
     </p:spTree>
     <p:extLst>
       <p:ext uri="{BB962C8B-B14F-4D97-AF65-F5344CB8AC3E}">
@@ -36814,29 +35692,6 @@
               <a:rPr lang="en-US" smtClean="0"/>
               <a:t>9</a:t>
             </a:fld>
-            <a:endParaRPr lang="en-US"/>
-          </a:p>
-        </p:txBody>
-      </p:sp>
-      <p:sp>
-        <p:nvSpPr>
-          <p:cNvPr id="10" name="Footer Placeholder 9"/>
-          <p:cNvSpPr>
-            <a:spLocks noGrp="1"/>
-          </p:cNvSpPr>
-          <p:nvPr>
-            <p:ph type="ftr" sz="quarter" idx="11"/>
-          </p:nvPr>
-        </p:nvSpPr>
-        <p:spPr/>
-        <p:txBody>
-          <a:bodyPr/>
-          <a:lstStyle/>
-          <a:p>
-            <a:r>
-              <a:rPr lang="en-US" smtClean="0"/>
-              <a:t>https://github.com/StoneyJackson/git-ccscne-2016</a:t>
-            </a:r>
             <a:endParaRPr lang="en-US"/>
           </a:p>
         </p:txBody>

</xml_diff>

<commit_message>
Add licenses, update activity and README
</commit_message>
<xml_diff>
--- a/presentation.pptx
+++ b/presentation.pptx
@@ -3987,7 +3987,12 @@
             <p:ph type="ctrTitle"/>
           </p:nvPr>
         </p:nvSpPr>
-        <p:spPr/>
+        <p:spPr>
+          <a:xfrm>
+            <a:off x="685800" y="587369"/>
+            <a:ext cx="7772400" cy="1470025"/>
+          </a:xfrm>
+        </p:spPr>
         <p:txBody>
           <a:bodyPr/>
           <a:lstStyle/>
@@ -4013,18 +4018,19 @@
             <p:ph type="subTitle" idx="1"/>
           </p:nvPr>
         </p:nvSpPr>
-        <p:spPr/>
+        <p:spPr>
+          <a:xfrm>
+            <a:off x="1371600" y="2557456"/>
+            <a:ext cx="6400800" cy="1752600"/>
+          </a:xfrm>
+        </p:spPr>
         <p:txBody>
           <a:bodyPr/>
           <a:lstStyle/>
           <a:p>
             <a:r>
-              <a:rPr lang="en-US" dirty="0" err="1"/>
-              <a:t>Darci</a:t>
-            </a:r>
-            <a:r>
               <a:rPr lang="en-US" dirty="0"/>
-              <a:t> </a:t>
+              <a:t>Darci </a:t>
             </a:r>
             <a:r>
               <a:rPr lang="en-US" dirty="0" err="1"/>
@@ -4060,6 +4066,81 @@
               <a:t>1</a:t>
             </a:fld>
             <a:endParaRPr lang="en-US"/>
+          </a:p>
+        </p:txBody>
+      </p:sp>
+      <p:sp>
+        <p:nvSpPr>
+          <p:cNvPr id="5" name="Rectangle 4">
+            <a:extLst>
+              <a:ext uri="{FF2B5EF4-FFF2-40B4-BE49-F238E27FC236}">
+                <a16:creationId xmlns:a16="http://schemas.microsoft.com/office/drawing/2014/main" id="{53CC9DB1-BF76-AC41-A88C-AA7D6357233C}"/>
+              </a:ext>
+            </a:extLst>
+          </p:cNvPr>
+          <p:cNvSpPr/>
+          <p:nvPr/>
+        </p:nvSpPr>
+        <p:spPr>
+          <a:xfrm>
+            <a:off x="350044" y="4900136"/>
+            <a:ext cx="8443912" cy="1477328"/>
+          </a:xfrm>
+          <a:prstGeom prst="rect">
+            <a:avLst/>
+          </a:prstGeom>
+        </p:spPr>
+        <p:txBody>
+          <a:bodyPr wrap="square">
+            <a:spAutoFit/>
+          </a:bodyPr>
+          <a:lstStyle/>
+          <a:p>
+            <a:r>
+              <a:rPr lang="en-US" dirty="0"/>
+              <a:t>Copyright 2018 Darci </a:t>
+            </a:r>
+            <a:r>
+              <a:rPr lang="en-US" dirty="0" err="1"/>
+              <a:t>Burdge</a:t>
+            </a:r>
+            <a:r>
+              <a:rPr lang="en-US" dirty="0"/>
+              <a:t> and Stoney Jackson SOME RIGHTS RESERVED</a:t>
+            </a:r>
+          </a:p>
+          <a:p>
+            <a:endParaRPr lang="en-US" dirty="0"/>
+          </a:p>
+          <a:p>
+            <a:r>
+              <a:rPr lang="en-US" dirty="0"/>
+              <a:t>This work is licensed under the Creative Commons Attribution-</a:t>
+            </a:r>
+            <a:r>
+              <a:rPr lang="en-US" dirty="0" err="1"/>
+              <a:t>ShareAlike</a:t>
+            </a:r>
+            <a:r>
+              <a:rPr lang="en-US" dirty="0"/>
+              <a:t> 4.0 International License. To view a copy of this license, visit http://</a:t>
+            </a:r>
+            <a:r>
+              <a:rPr lang="en-US" dirty="0" err="1"/>
+              <a:t>creativecommons.org</a:t>
+            </a:r>
+            <a:r>
+              <a:rPr lang="en-US" dirty="0"/>
+              <a:t>/licenses/by-</a:t>
+            </a:r>
+            <a:r>
+              <a:rPr lang="en-US" dirty="0" err="1"/>
+              <a:t>sa</a:t>
+            </a:r>
+            <a:r>
+              <a:rPr lang="en-US" dirty="0"/>
+              <a:t>/4.0/ .</a:t>
+            </a:r>
           </a:p>
         </p:txBody>
       </p:sp>
@@ -44316,7 +44397,7 @@
           <a:noFill/>
           <a:extLst>
             <a:ext uri="{909E8E84-426E-40dd-AFC4-6F175D3DCCD1}">
-              <a14:hiddenFill xmlns:a14="http://schemas.microsoft.com/office/drawing/2010/main" xmlns="">
+              <a14:hiddenFill xmlns="" xmlns:a14="http://schemas.microsoft.com/office/drawing/2010/main">
                 <a:solidFill>
                   <a:srgbClr val="FFFFFF"/>
                 </a:solidFill>

</xml_diff>